<commit_message>
Added in conformance resources and updated based on CP that was added/published after the intial conversion.
</commit_message>
<xml_diff>
--- a/input/images-source/Images.pptx
+++ b/input/images-source/Images.pptx
@@ -6,6 +6,7 @@
   </p:sldMasterIdLst>
   <p:sldIdLst>
     <p:sldId id="256" r:id="rId2"/>
+    <p:sldId id="257" r:id="rId3"/>
   </p:sldIdLst>
   <p:sldSz cx="12192000" cy="6858000"/>
   <p:notesSz cx="6858000" cy="9144000"/>
@@ -104,6 +105,11 @@
       </a:defRPr>
     </a:lvl9pPr>
   </p:defaultTextStyle>
+  <p:extLst>
+    <p:ext uri="{EFAFB233-063F-42B5-8137-9DF3F51BA10A}">
+      <p15:sldGuideLst xmlns:p15="http://schemas.microsoft.com/office/powerpoint/2012/main"/>
+    </p:ext>
+  </p:extLst>
 </p:presentation>
 </file>
 
@@ -3456,7 +3462,7 @@
           <a:p>
             <a:fld id="{8D19A3AA-5CC1-4409-A3F5-5174B3C1B3E1}" type="datetimeFigureOut">
               <a:rPr lang="en-CA" smtClean="0"/>
-              <a:t>2019-09-11</a:t>
+              <a:t>2022-06-10</a:t>
             </a:fld>
             <a:endParaRPr lang="en-CA"/>
           </a:p>
@@ -3656,7 +3662,7 @@
           <a:p>
             <a:fld id="{8D19A3AA-5CC1-4409-A3F5-5174B3C1B3E1}" type="datetimeFigureOut">
               <a:rPr lang="en-CA" smtClean="0"/>
-              <a:t>2019-09-11</a:t>
+              <a:t>2022-06-10</a:t>
             </a:fld>
             <a:endParaRPr lang="en-CA"/>
           </a:p>
@@ -3866,7 +3872,7 @@
           <a:p>
             <a:fld id="{8D19A3AA-5CC1-4409-A3F5-5174B3C1B3E1}" type="datetimeFigureOut">
               <a:rPr lang="en-CA" smtClean="0"/>
-              <a:t>2019-09-11</a:t>
+              <a:t>2022-06-10</a:t>
             </a:fld>
             <a:endParaRPr lang="en-CA"/>
           </a:p>
@@ -4066,7 +4072,7 @@
           <a:p>
             <a:fld id="{8D19A3AA-5CC1-4409-A3F5-5174B3C1B3E1}" type="datetimeFigureOut">
               <a:rPr lang="en-CA" smtClean="0"/>
-              <a:t>2019-09-11</a:t>
+              <a:t>2022-06-10</a:t>
             </a:fld>
             <a:endParaRPr lang="en-CA"/>
           </a:p>
@@ -4342,7 +4348,7 @@
           <a:p>
             <a:fld id="{8D19A3AA-5CC1-4409-A3F5-5174B3C1B3E1}" type="datetimeFigureOut">
               <a:rPr lang="en-CA" smtClean="0"/>
-              <a:t>2019-09-11</a:t>
+              <a:t>2022-06-10</a:t>
             </a:fld>
             <a:endParaRPr lang="en-CA"/>
           </a:p>
@@ -4610,7 +4616,7 @@
           <a:p>
             <a:fld id="{8D19A3AA-5CC1-4409-A3F5-5174B3C1B3E1}" type="datetimeFigureOut">
               <a:rPr lang="en-CA" smtClean="0"/>
-              <a:t>2019-09-11</a:t>
+              <a:t>2022-06-10</a:t>
             </a:fld>
             <a:endParaRPr lang="en-CA"/>
           </a:p>
@@ -5025,7 +5031,7 @@
           <a:p>
             <a:fld id="{8D19A3AA-5CC1-4409-A3F5-5174B3C1B3E1}" type="datetimeFigureOut">
               <a:rPr lang="en-CA" smtClean="0"/>
-              <a:t>2019-09-11</a:t>
+              <a:t>2022-06-10</a:t>
             </a:fld>
             <a:endParaRPr lang="en-CA"/>
           </a:p>
@@ -5167,7 +5173,7 @@
           <a:p>
             <a:fld id="{8D19A3AA-5CC1-4409-A3F5-5174B3C1B3E1}" type="datetimeFigureOut">
               <a:rPr lang="en-CA" smtClean="0"/>
-              <a:t>2019-09-11</a:t>
+              <a:t>2022-06-10</a:t>
             </a:fld>
             <a:endParaRPr lang="en-CA"/>
           </a:p>
@@ -5280,7 +5286,7 @@
           <a:p>
             <a:fld id="{8D19A3AA-5CC1-4409-A3F5-5174B3C1B3E1}" type="datetimeFigureOut">
               <a:rPr lang="en-CA" smtClean="0"/>
-              <a:t>2019-09-11</a:t>
+              <a:t>2022-06-10</a:t>
             </a:fld>
             <a:endParaRPr lang="en-CA"/>
           </a:p>
@@ -5593,7 +5599,7 @@
           <a:p>
             <a:fld id="{8D19A3AA-5CC1-4409-A3F5-5174B3C1B3E1}" type="datetimeFigureOut">
               <a:rPr lang="en-CA" smtClean="0"/>
-              <a:t>2019-09-11</a:t>
+              <a:t>2022-06-10</a:t>
             </a:fld>
             <a:endParaRPr lang="en-CA"/>
           </a:p>
@@ -5882,7 +5888,7 @@
           <a:p>
             <a:fld id="{8D19A3AA-5CC1-4409-A3F5-5174B3C1B3E1}" type="datetimeFigureOut">
               <a:rPr lang="en-CA" smtClean="0"/>
-              <a:t>2019-09-11</a:t>
+              <a:t>2022-06-10</a:t>
             </a:fld>
             <a:endParaRPr lang="en-CA"/>
           </a:p>
@@ -6125,7 +6131,7 @@
           <a:p>
             <a:fld id="{8D19A3AA-5CC1-4409-A3F5-5174B3C1B3E1}" type="datetimeFigureOut">
               <a:rPr lang="en-CA" smtClean="0"/>
-              <a:t>2019-09-11</a:t>
+              <a:t>2022-06-10</a:t>
             </a:fld>
             <a:endParaRPr lang="en-CA"/>
           </a:p>
@@ -6583,6 +6589,912 @@
 </p:sld>
 </file>
 
+<file path=ppt/slides/slide2.xml><?xml version="1.0" encoding="utf-8"?>
+<p:sld xmlns:a="http://schemas.openxmlformats.org/drawingml/2006/main" xmlns:r="http://schemas.openxmlformats.org/officeDocument/2006/relationships" xmlns:p="http://schemas.openxmlformats.org/presentationml/2006/main">
+  <p:cSld>
+    <p:spTree>
+      <p:nvGrpSpPr>
+        <p:cNvPr id="1" name=""/>
+        <p:cNvGrpSpPr/>
+        <p:nvPr/>
+      </p:nvGrpSpPr>
+      <p:grpSpPr>
+        <a:xfrm>
+          <a:off x="0" y="0"/>
+          <a:ext cx="0" cy="0"/>
+          <a:chOff x="0" y="0"/>
+          <a:chExt cx="0" cy="0"/>
+        </a:xfrm>
+      </p:grpSpPr>
+      <p:grpSp>
+        <p:nvGrpSpPr>
+          <p:cNvPr id="8" name="Group 7">
+            <a:extLst>
+              <a:ext uri="{FF2B5EF4-FFF2-40B4-BE49-F238E27FC236}">
+                <a16:creationId xmlns:a16="http://schemas.microsoft.com/office/drawing/2014/main" id="{5E0F395D-0CD8-35A0-45B6-BAE274F3E036}"/>
+              </a:ext>
+            </a:extLst>
+          </p:cNvPr>
+          <p:cNvGrpSpPr>
+            <a:grpSpLocks/>
+          </p:cNvGrpSpPr>
+          <p:nvPr/>
+        </p:nvGrpSpPr>
+        <p:grpSpPr bwMode="auto">
+          <a:xfrm>
+            <a:off x="3652837" y="2047875"/>
+            <a:ext cx="4886325" cy="2762250"/>
+            <a:chOff x="0" y="3905"/>
+            <a:chExt cx="48863" cy="24956"/>
+          </a:xfrm>
+        </p:grpSpPr>
+        <p:sp>
+          <p:nvSpPr>
+            <p:cNvPr id="9" name="AutoShape 8">
+              <a:extLst>
+                <a:ext uri="{FF2B5EF4-FFF2-40B4-BE49-F238E27FC236}">
+                  <a16:creationId xmlns:a16="http://schemas.microsoft.com/office/drawing/2014/main" id="{675CF55A-A691-9B83-E96F-1AD7D0FFB45C}"/>
+                </a:ext>
+              </a:extLst>
+            </p:cNvPr>
+            <p:cNvSpPr>
+              <a:spLocks noChangeAspect="1" noChangeArrowheads="1"/>
+            </p:cNvSpPr>
+            <p:nvPr/>
+          </p:nvSpPr>
+          <p:spPr bwMode="auto">
+            <a:xfrm>
+              <a:off x="0" y="3905"/>
+              <a:ext cx="48863" cy="24956"/>
+            </a:xfrm>
+            <a:prstGeom prst="rect">
+              <a:avLst/>
+            </a:prstGeom>
+            <a:noFill/>
+            <a:ln>
+              <a:noFill/>
+            </a:ln>
+            <a:extLst>
+              <a:ext uri="{909E8E84-426E-40DD-AFC4-6F175D3DCCD1}">
+                <a14:hiddenFill xmlns:a14="http://schemas.microsoft.com/office/drawing/2010/main">
+                  <a:solidFill>
+                    <a:srgbClr val="FFFFFF"/>
+                  </a:solidFill>
+                </a14:hiddenFill>
+              </a:ext>
+              <a:ext uri="{91240B29-F687-4F45-9708-019B960494DF}">
+                <a14:hiddenLine xmlns:a14="http://schemas.microsoft.com/office/drawing/2010/main" w="9525">
+                  <a:solidFill>
+                    <a:srgbClr val="000000"/>
+                  </a:solidFill>
+                  <a:miter lim="800000"/>
+                  <a:headEnd/>
+                  <a:tailEnd/>
+                </a14:hiddenLine>
+              </a:ext>
+            </a:extLst>
+          </p:spPr>
+          <p:txBody>
+            <a:bodyPr rot="0" vert="horz" wrap="square" lIns="91440" tIns="45720" rIns="91440" bIns="45720" anchor="t" anchorCtr="0" upright="1">
+              <a:noAutofit/>
+            </a:bodyPr>
+            <a:lstStyle/>
+            <a:p>
+              <a:endParaRPr lang="en-US"/>
+            </a:p>
+          </p:txBody>
+        </p:sp>
+        <p:sp>
+          <p:nvSpPr>
+            <p:cNvPr id="10" name="Rectangle 9">
+              <a:extLst>
+                <a:ext uri="{FF2B5EF4-FFF2-40B4-BE49-F238E27FC236}">
+                  <a16:creationId xmlns:a16="http://schemas.microsoft.com/office/drawing/2014/main" id="{0E61C89B-B788-EB27-4F27-F1BC13A3FC96}"/>
+                </a:ext>
+              </a:extLst>
+            </p:cNvPr>
+            <p:cNvSpPr>
+              <a:spLocks noChangeArrowheads="1"/>
+            </p:cNvSpPr>
+            <p:nvPr/>
+          </p:nvSpPr>
+          <p:spPr bwMode="auto">
+            <a:xfrm>
+              <a:off x="2901" y="5114"/>
+              <a:ext cx="10287" cy="22137"/>
+            </a:xfrm>
+            <a:prstGeom prst="rect">
+              <a:avLst/>
+            </a:prstGeom>
+            <a:solidFill>
+              <a:srgbClr val="FFFFFF"/>
+            </a:solidFill>
+            <a:ln w="9525">
+              <a:solidFill>
+                <a:srgbClr val="000000"/>
+              </a:solidFill>
+              <a:miter lim="800000"/>
+              <a:headEnd/>
+              <a:tailEnd/>
+            </a:ln>
+          </p:spPr>
+          <p:txBody>
+            <a:bodyPr rot="0" vert="horz" wrap="square" lIns="91440" tIns="45720" rIns="91440" bIns="45720" anchor="ctr" anchorCtr="0" upright="1">
+              <a:noAutofit/>
+            </a:bodyPr>
+            <a:lstStyle/>
+            <a:p>
+              <a:pPr marL="0" marR="0" algn="ctr">
+                <a:spcBef>
+                  <a:spcPts val="0"/>
+                </a:spcBef>
+                <a:spcAft>
+                  <a:spcPts val="0"/>
+                </a:spcAft>
+              </a:pPr>
+              <a:r>
+                <a:rPr lang="en-US" sz="1200" dirty="0">
+                  <a:effectLst/>
+                  <a:latin typeface="Times New Roman" panose="02020603050405020304" pitchFamily="18" charset="0"/>
+                  <a:ea typeface="Times New Roman" panose="02020603050405020304" pitchFamily="18" charset="0"/>
+                </a:rPr>
+                <a:t>Terminology Repository</a:t>
+              </a:r>
+            </a:p>
+          </p:txBody>
+        </p:sp>
+        <p:sp>
+          <p:nvSpPr>
+            <p:cNvPr id="11" name="Rectangle 10">
+              <a:extLst>
+                <a:ext uri="{FF2B5EF4-FFF2-40B4-BE49-F238E27FC236}">
+                  <a16:creationId xmlns:a16="http://schemas.microsoft.com/office/drawing/2014/main" id="{E186D1B9-0FB7-65F6-9178-A67FE3F8C0A1}"/>
+                </a:ext>
+              </a:extLst>
+            </p:cNvPr>
+            <p:cNvSpPr>
+              <a:spLocks noChangeArrowheads="1"/>
+            </p:cNvSpPr>
+            <p:nvPr/>
+          </p:nvSpPr>
+          <p:spPr bwMode="auto">
+            <a:xfrm>
+              <a:off x="35433" y="5114"/>
+              <a:ext cx="10287" cy="22137"/>
+            </a:xfrm>
+            <a:prstGeom prst="rect">
+              <a:avLst/>
+            </a:prstGeom>
+            <a:solidFill>
+              <a:srgbClr val="FFFFFF"/>
+            </a:solidFill>
+            <a:ln w="9525">
+              <a:solidFill>
+                <a:srgbClr val="000000"/>
+              </a:solidFill>
+              <a:miter lim="800000"/>
+              <a:headEnd/>
+              <a:tailEnd/>
+            </a:ln>
+          </p:spPr>
+          <p:txBody>
+            <a:bodyPr rot="0" vert="horz" wrap="square" lIns="91440" tIns="45720" rIns="91440" bIns="45720" anchor="ctr" anchorCtr="0" upright="1">
+              <a:noAutofit/>
+            </a:bodyPr>
+            <a:lstStyle/>
+            <a:p>
+              <a:pPr marL="0" marR="0" algn="ctr">
+                <a:spcBef>
+                  <a:spcPts val="0"/>
+                </a:spcBef>
+                <a:spcAft>
+                  <a:spcPts val="0"/>
+                </a:spcAft>
+              </a:pPr>
+              <a:r>
+                <a:rPr lang="en-US" sz="1200" dirty="0">
+                  <a:effectLst/>
+                  <a:latin typeface="Times New Roman" panose="02020603050405020304" pitchFamily="18" charset="0"/>
+                  <a:ea typeface="Times New Roman" panose="02020603050405020304" pitchFamily="18" charset="0"/>
+                </a:rPr>
+                <a:t>Terminology Consumer</a:t>
+              </a:r>
+            </a:p>
+          </p:txBody>
+        </p:sp>
+      </p:grpSp>
+      <p:cxnSp>
+        <p:nvCxnSpPr>
+          <p:cNvPr id="26" name="Line 17">
+            <a:extLst>
+              <a:ext uri="{FF2B5EF4-FFF2-40B4-BE49-F238E27FC236}">
+                <a16:creationId xmlns:a16="http://schemas.microsoft.com/office/drawing/2014/main" id="{19AA816B-F7F4-11A0-DB65-9024E3460D0C}"/>
+              </a:ext>
+            </a:extLst>
+          </p:cNvPr>
+          <p:cNvCxnSpPr>
+            <a:cxnSpLocks noChangeShapeType="1"/>
+          </p:cNvCxnSpPr>
+          <p:nvPr/>
+        </p:nvCxnSpPr>
+        <p:spPr bwMode="auto">
+          <a:xfrm flipH="1">
+            <a:off x="4967247" y="2595494"/>
+            <a:ext cx="2224405" cy="0"/>
+          </a:xfrm>
+          <a:prstGeom prst="line">
+            <a:avLst/>
+          </a:prstGeom>
+          <a:noFill/>
+          <a:ln w="9525">
+            <a:solidFill>
+              <a:srgbClr val="000000"/>
+            </a:solidFill>
+            <a:round/>
+            <a:headEnd/>
+            <a:tailEnd type="triangle" w="med" len="med"/>
+          </a:ln>
+          <a:extLst>
+            <a:ext uri="{909E8E84-426E-40DD-AFC4-6F175D3DCCD1}">
+              <a14:hiddenFill xmlns:a14="http://schemas.microsoft.com/office/drawing/2010/main">
+                <a:noFill/>
+              </a14:hiddenFill>
+            </a:ext>
+          </a:extLst>
+        </p:spPr>
+      </p:cxnSp>
+      <p:sp>
+        <p:nvSpPr>
+          <p:cNvPr id="31" name="Text Box 19">
+            <a:extLst>
+              <a:ext uri="{FF2B5EF4-FFF2-40B4-BE49-F238E27FC236}">
+                <a16:creationId xmlns:a16="http://schemas.microsoft.com/office/drawing/2014/main" id="{71959482-F886-3D9D-3CDE-7C0E037AE037}"/>
+              </a:ext>
+            </a:extLst>
+          </p:cNvPr>
+          <p:cNvSpPr txBox="1">
+            <a:spLocks noChangeArrowheads="1"/>
+          </p:cNvSpPr>
+          <p:nvPr/>
+        </p:nvSpPr>
+        <p:spPr bwMode="auto">
+          <a:xfrm>
+            <a:off x="4911367" y="2335779"/>
+            <a:ext cx="2219960" cy="210185"/>
+          </a:xfrm>
+          <a:prstGeom prst="rect">
+            <a:avLst/>
+          </a:prstGeom>
+          <a:noFill/>
+          <a:ln>
+            <a:noFill/>
+          </a:ln>
+        </p:spPr>
+        <p:txBody>
+          <a:bodyPr rot="0" vert="horz" wrap="square" lIns="0" tIns="0" rIns="0" bIns="0" anchor="ctr" anchorCtr="0" upright="1">
+            <a:noAutofit/>
+          </a:bodyPr>
+          <a:lstStyle/>
+          <a:p>
+            <a:pPr marL="0" marR="0" algn="ctr">
+              <a:spcBef>
+                <a:spcPts val="0"/>
+              </a:spcBef>
+              <a:spcAft>
+                <a:spcPts val="0"/>
+              </a:spcAft>
+            </a:pPr>
+            <a:r>
+              <a:rPr lang="en-US" sz="1000" dirty="0">
+                <a:effectLst/>
+                <a:latin typeface="Times New Roman" panose="02020603050405020304" pitchFamily="18" charset="0"/>
+                <a:ea typeface="Times New Roman" panose="02020603050405020304" pitchFamily="18" charset="0"/>
+              </a:rPr>
+              <a:t>Query Value Set [ITI-95]</a:t>
+            </a:r>
+            <a:endParaRPr lang="en-US" sz="1200" dirty="0">
+              <a:effectLst/>
+              <a:latin typeface="Times New Roman" panose="02020603050405020304" pitchFamily="18" charset="0"/>
+              <a:ea typeface="Times New Roman" panose="02020603050405020304" pitchFamily="18" charset="0"/>
+            </a:endParaRPr>
+          </a:p>
+        </p:txBody>
+      </p:sp>
+      <p:sp>
+        <p:nvSpPr>
+          <p:cNvPr id="32" name="Text Box 19">
+            <a:extLst>
+              <a:ext uri="{FF2B5EF4-FFF2-40B4-BE49-F238E27FC236}">
+                <a16:creationId xmlns:a16="http://schemas.microsoft.com/office/drawing/2014/main" id="{C34754BF-70A6-9298-BEC2-01A78D47A815}"/>
+              </a:ext>
+            </a:extLst>
+          </p:cNvPr>
+          <p:cNvSpPr txBox="1">
+            <a:spLocks noChangeArrowheads="1"/>
+          </p:cNvSpPr>
+          <p:nvPr/>
+        </p:nvSpPr>
+        <p:spPr bwMode="auto">
+          <a:xfrm>
+            <a:off x="5096787" y="3029199"/>
+            <a:ext cx="1856105" cy="210185"/>
+          </a:xfrm>
+          <a:prstGeom prst="rect">
+            <a:avLst/>
+          </a:prstGeom>
+          <a:noFill/>
+          <a:ln>
+            <a:noFill/>
+          </a:ln>
+        </p:spPr>
+        <p:txBody>
+          <a:bodyPr rot="0" vert="horz" wrap="square" lIns="0" tIns="0" rIns="0" bIns="0" anchor="ctr" anchorCtr="0" upright="1">
+            <a:noAutofit/>
+          </a:bodyPr>
+          <a:lstStyle/>
+          <a:p>
+            <a:pPr marL="0" marR="0" algn="ctr">
+              <a:spcBef>
+                <a:spcPts val="0"/>
+              </a:spcBef>
+              <a:spcAft>
+                <a:spcPts val="0"/>
+              </a:spcAft>
+            </a:pPr>
+            <a:r>
+              <a:rPr lang="en-US" sz="1000">
+                <a:effectLst/>
+                <a:latin typeface="Times New Roman" panose="02020603050405020304" pitchFamily="18" charset="0"/>
+                <a:ea typeface="Times New Roman" panose="02020603050405020304" pitchFamily="18" charset="0"/>
+              </a:rPr>
+              <a:t>Expand Value Set [ITI-97]</a:t>
+            </a:r>
+            <a:endParaRPr lang="en-US" sz="1200">
+              <a:effectLst/>
+              <a:latin typeface="Times New Roman" panose="02020603050405020304" pitchFamily="18" charset="0"/>
+              <a:ea typeface="Times New Roman" panose="02020603050405020304" pitchFamily="18" charset="0"/>
+            </a:endParaRPr>
+          </a:p>
+        </p:txBody>
+      </p:sp>
+      <p:sp>
+        <p:nvSpPr>
+          <p:cNvPr id="33" name="Text Box 19">
+            <a:extLst>
+              <a:ext uri="{FF2B5EF4-FFF2-40B4-BE49-F238E27FC236}">
+                <a16:creationId xmlns:a16="http://schemas.microsoft.com/office/drawing/2014/main" id="{B7026828-7477-2F8C-09DC-538DC30B320D}"/>
+              </a:ext>
+            </a:extLst>
+          </p:cNvPr>
+          <p:cNvSpPr txBox="1">
+            <a:spLocks noChangeArrowheads="1"/>
+          </p:cNvSpPr>
+          <p:nvPr/>
+        </p:nvSpPr>
+        <p:spPr bwMode="auto">
+          <a:xfrm>
+            <a:off x="5096787" y="3331459"/>
+            <a:ext cx="1856105" cy="210185"/>
+          </a:xfrm>
+          <a:prstGeom prst="rect">
+            <a:avLst/>
+          </a:prstGeom>
+          <a:noFill/>
+          <a:ln>
+            <a:noFill/>
+          </a:ln>
+        </p:spPr>
+        <p:txBody>
+          <a:bodyPr rot="0" vert="horz" wrap="square" lIns="0" tIns="0" rIns="0" bIns="0" anchor="ctr" anchorCtr="0" upright="1">
+            <a:noAutofit/>
+          </a:bodyPr>
+          <a:lstStyle/>
+          <a:p>
+            <a:pPr marL="0" marR="0" algn="ctr">
+              <a:spcBef>
+                <a:spcPts val="0"/>
+              </a:spcBef>
+              <a:spcAft>
+                <a:spcPts val="0"/>
+              </a:spcAft>
+            </a:pPr>
+            <a:r>
+              <a:rPr lang="en-US" sz="1000">
+                <a:effectLst/>
+                <a:latin typeface="Times New Roman" panose="02020603050405020304" pitchFamily="18" charset="0"/>
+                <a:ea typeface="Times New Roman" panose="02020603050405020304" pitchFamily="18" charset="0"/>
+              </a:rPr>
+              <a:t>Lookup Code [ITI-98]</a:t>
+            </a:r>
+            <a:endParaRPr lang="en-US" sz="1200">
+              <a:effectLst/>
+              <a:latin typeface="Times New Roman" panose="02020603050405020304" pitchFamily="18" charset="0"/>
+              <a:ea typeface="Times New Roman" panose="02020603050405020304" pitchFamily="18" charset="0"/>
+            </a:endParaRPr>
+          </a:p>
+        </p:txBody>
+      </p:sp>
+      <p:sp>
+        <p:nvSpPr>
+          <p:cNvPr id="34" name="Text Box 19">
+            <a:extLst>
+              <a:ext uri="{FF2B5EF4-FFF2-40B4-BE49-F238E27FC236}">
+                <a16:creationId xmlns:a16="http://schemas.microsoft.com/office/drawing/2014/main" id="{6365553B-75E4-7742-D5DC-F5B57FB805F3}"/>
+              </a:ext>
+            </a:extLst>
+          </p:cNvPr>
+          <p:cNvSpPr txBox="1">
+            <a:spLocks noChangeArrowheads="1"/>
+          </p:cNvSpPr>
+          <p:nvPr/>
+        </p:nvSpPr>
+        <p:spPr bwMode="auto">
+          <a:xfrm>
+            <a:off x="5096787" y="3632449"/>
+            <a:ext cx="1856105" cy="210185"/>
+          </a:xfrm>
+          <a:prstGeom prst="rect">
+            <a:avLst/>
+          </a:prstGeom>
+          <a:noFill/>
+          <a:ln>
+            <a:noFill/>
+          </a:ln>
+        </p:spPr>
+        <p:txBody>
+          <a:bodyPr rot="0" vert="horz" wrap="square" lIns="0" tIns="0" rIns="0" bIns="0" anchor="ctr" anchorCtr="0" upright="1">
+            <a:noAutofit/>
+          </a:bodyPr>
+          <a:lstStyle/>
+          <a:p>
+            <a:pPr marL="0" marR="0" algn="ctr">
+              <a:spcBef>
+                <a:spcPts val="0"/>
+              </a:spcBef>
+              <a:spcAft>
+                <a:spcPts val="0"/>
+              </a:spcAft>
+            </a:pPr>
+            <a:r>
+              <a:rPr lang="en-US" sz="1000">
+                <a:effectLst/>
+                <a:latin typeface="Times New Roman" panose="02020603050405020304" pitchFamily="18" charset="0"/>
+                <a:ea typeface="Times New Roman" panose="02020603050405020304" pitchFamily="18" charset="0"/>
+              </a:rPr>
+              <a:t>Validate Code [ITI-99]</a:t>
+            </a:r>
+            <a:endParaRPr lang="en-US" sz="1200">
+              <a:effectLst/>
+              <a:latin typeface="Times New Roman" panose="02020603050405020304" pitchFamily="18" charset="0"/>
+              <a:ea typeface="Times New Roman" panose="02020603050405020304" pitchFamily="18" charset="0"/>
+            </a:endParaRPr>
+          </a:p>
+        </p:txBody>
+      </p:sp>
+      <p:sp>
+        <p:nvSpPr>
+          <p:cNvPr id="35" name="Text Box 19">
+            <a:extLst>
+              <a:ext uri="{FF2B5EF4-FFF2-40B4-BE49-F238E27FC236}">
+                <a16:creationId xmlns:a16="http://schemas.microsoft.com/office/drawing/2014/main" id="{21CC87BE-5851-DEDD-AAF1-E9D1BD714F58}"/>
+              </a:ext>
+            </a:extLst>
+          </p:cNvPr>
+          <p:cNvSpPr txBox="1">
+            <a:spLocks noChangeArrowheads="1"/>
+          </p:cNvSpPr>
+          <p:nvPr/>
+        </p:nvSpPr>
+        <p:spPr bwMode="auto">
+          <a:xfrm>
+            <a:off x="5096787" y="4232524"/>
+            <a:ext cx="1856105" cy="210185"/>
+          </a:xfrm>
+          <a:prstGeom prst="rect">
+            <a:avLst/>
+          </a:prstGeom>
+          <a:noFill/>
+          <a:ln>
+            <a:noFill/>
+          </a:ln>
+        </p:spPr>
+        <p:txBody>
+          <a:bodyPr rot="0" vert="horz" wrap="square" lIns="0" tIns="0" rIns="0" bIns="0" anchor="ctr" anchorCtr="0" upright="1">
+            <a:noAutofit/>
+          </a:bodyPr>
+          <a:lstStyle/>
+          <a:p>
+            <a:pPr marL="0" marR="0" algn="ctr">
+              <a:spcBef>
+                <a:spcPts val="0"/>
+              </a:spcBef>
+              <a:spcAft>
+                <a:spcPts val="0"/>
+              </a:spcAft>
+            </a:pPr>
+            <a:r>
+              <a:rPr lang="en-US" sz="1000">
+                <a:effectLst/>
+                <a:latin typeface="Times New Roman" panose="02020603050405020304" pitchFamily="18" charset="0"/>
+                <a:ea typeface="Times New Roman" panose="02020603050405020304" pitchFamily="18" charset="0"/>
+              </a:rPr>
+              <a:t>Translate Code [ITI-101]</a:t>
+            </a:r>
+            <a:endParaRPr lang="en-US" sz="1200">
+              <a:effectLst/>
+              <a:latin typeface="Times New Roman" panose="02020603050405020304" pitchFamily="18" charset="0"/>
+              <a:ea typeface="Times New Roman" panose="02020603050405020304" pitchFamily="18" charset="0"/>
+            </a:endParaRPr>
+          </a:p>
+        </p:txBody>
+      </p:sp>
+      <p:sp>
+        <p:nvSpPr>
+          <p:cNvPr id="37" name="Text Box 19">
+            <a:extLst>
+              <a:ext uri="{FF2B5EF4-FFF2-40B4-BE49-F238E27FC236}">
+                <a16:creationId xmlns:a16="http://schemas.microsoft.com/office/drawing/2014/main" id="{488B8336-BFBF-A2E3-FD24-6AA2532D284E}"/>
+              </a:ext>
+            </a:extLst>
+          </p:cNvPr>
+          <p:cNvSpPr txBox="1">
+            <a:spLocks noChangeArrowheads="1"/>
+          </p:cNvSpPr>
+          <p:nvPr/>
+        </p:nvSpPr>
+        <p:spPr bwMode="auto">
+          <a:xfrm>
+            <a:off x="4915177" y="3914389"/>
+            <a:ext cx="2219960" cy="210185"/>
+          </a:xfrm>
+          <a:prstGeom prst="rect">
+            <a:avLst/>
+          </a:prstGeom>
+          <a:noFill/>
+          <a:ln>
+            <a:noFill/>
+          </a:ln>
+        </p:spPr>
+        <p:txBody>
+          <a:bodyPr rot="0" vert="horz" wrap="square" lIns="0" tIns="0" rIns="0" bIns="0" anchor="ctr" anchorCtr="0" upright="1">
+            <a:noAutofit/>
+          </a:bodyPr>
+          <a:lstStyle/>
+          <a:p>
+            <a:pPr marL="0" marR="0" algn="ctr">
+              <a:spcBef>
+                <a:spcPts val="0"/>
+              </a:spcBef>
+              <a:spcAft>
+                <a:spcPts val="0"/>
+              </a:spcAft>
+            </a:pPr>
+            <a:r>
+              <a:rPr lang="en-US" sz="1000">
+                <a:effectLst/>
+                <a:latin typeface="Times New Roman" panose="02020603050405020304" pitchFamily="18" charset="0"/>
+                <a:ea typeface="Times New Roman" panose="02020603050405020304" pitchFamily="18" charset="0"/>
+              </a:rPr>
+              <a:t>Query Concept Map [ITI-100]</a:t>
+            </a:r>
+            <a:endParaRPr lang="en-US" sz="1200">
+              <a:effectLst/>
+              <a:latin typeface="Times New Roman" panose="02020603050405020304" pitchFamily="18" charset="0"/>
+              <a:ea typeface="Times New Roman" panose="02020603050405020304" pitchFamily="18" charset="0"/>
+            </a:endParaRPr>
+          </a:p>
+        </p:txBody>
+      </p:sp>
+      <p:sp>
+        <p:nvSpPr>
+          <p:cNvPr id="39" name="Text Box 19">
+            <a:extLst>
+              <a:ext uri="{FF2B5EF4-FFF2-40B4-BE49-F238E27FC236}">
+                <a16:creationId xmlns:a16="http://schemas.microsoft.com/office/drawing/2014/main" id="{4AAF8DCE-0C65-67C3-2682-31257B024234}"/>
+              </a:ext>
+            </a:extLst>
+          </p:cNvPr>
+          <p:cNvSpPr txBox="1">
+            <a:spLocks noChangeArrowheads="1"/>
+          </p:cNvSpPr>
+          <p:nvPr/>
+        </p:nvSpPr>
+        <p:spPr bwMode="auto">
+          <a:xfrm>
+            <a:off x="4921527" y="2669154"/>
+            <a:ext cx="2219960" cy="210185"/>
+          </a:xfrm>
+          <a:prstGeom prst="rect">
+            <a:avLst/>
+          </a:prstGeom>
+          <a:noFill/>
+          <a:ln>
+            <a:noFill/>
+          </a:ln>
+        </p:spPr>
+        <p:txBody>
+          <a:bodyPr rot="0" vert="horz" wrap="square" lIns="0" tIns="0" rIns="0" bIns="0" anchor="ctr" anchorCtr="0" upright="1">
+            <a:noAutofit/>
+          </a:bodyPr>
+          <a:lstStyle/>
+          <a:p>
+            <a:pPr marL="0" marR="0" algn="ctr">
+              <a:spcBef>
+                <a:spcPts val="0"/>
+              </a:spcBef>
+              <a:spcAft>
+                <a:spcPts val="0"/>
+              </a:spcAft>
+            </a:pPr>
+            <a:r>
+              <a:rPr lang="en-US" sz="1000">
+                <a:effectLst/>
+                <a:latin typeface="Times New Roman" panose="02020603050405020304" pitchFamily="18" charset="0"/>
+                <a:ea typeface="Times New Roman" panose="02020603050405020304" pitchFamily="18" charset="0"/>
+              </a:rPr>
+              <a:t>Query Code System [ITI-96]</a:t>
+            </a:r>
+            <a:endParaRPr lang="en-US" sz="1200">
+              <a:effectLst/>
+              <a:latin typeface="Times New Roman" panose="02020603050405020304" pitchFamily="18" charset="0"/>
+              <a:ea typeface="Times New Roman" panose="02020603050405020304" pitchFamily="18" charset="0"/>
+            </a:endParaRPr>
+          </a:p>
+        </p:txBody>
+      </p:sp>
+      <p:cxnSp>
+        <p:nvCxnSpPr>
+          <p:cNvPr id="46" name="Line 17">
+            <a:extLst>
+              <a:ext uri="{FF2B5EF4-FFF2-40B4-BE49-F238E27FC236}">
+                <a16:creationId xmlns:a16="http://schemas.microsoft.com/office/drawing/2014/main" id="{FFA0AD53-CA77-35B9-A1BC-24AA475F83F9}"/>
+              </a:ext>
+            </a:extLst>
+          </p:cNvPr>
+          <p:cNvCxnSpPr>
+            <a:cxnSpLocks noChangeShapeType="1"/>
+          </p:cNvCxnSpPr>
+          <p:nvPr/>
+        </p:nvCxnSpPr>
+        <p:spPr bwMode="auto">
+          <a:xfrm flipH="1">
+            <a:off x="4970562" y="2926796"/>
+            <a:ext cx="2224405" cy="0"/>
+          </a:xfrm>
+          <a:prstGeom prst="line">
+            <a:avLst/>
+          </a:prstGeom>
+          <a:noFill/>
+          <a:ln w="9525">
+            <a:solidFill>
+              <a:srgbClr val="000000"/>
+            </a:solidFill>
+            <a:round/>
+            <a:headEnd/>
+            <a:tailEnd type="triangle" w="med" len="med"/>
+          </a:ln>
+          <a:extLst>
+            <a:ext uri="{909E8E84-426E-40DD-AFC4-6F175D3DCCD1}">
+              <a14:hiddenFill xmlns:a14="http://schemas.microsoft.com/office/drawing/2010/main">
+                <a:noFill/>
+              </a14:hiddenFill>
+            </a:ext>
+          </a:extLst>
+        </p:spPr>
+      </p:cxnSp>
+      <p:cxnSp>
+        <p:nvCxnSpPr>
+          <p:cNvPr id="48" name="Line 17">
+            <a:extLst>
+              <a:ext uri="{FF2B5EF4-FFF2-40B4-BE49-F238E27FC236}">
+                <a16:creationId xmlns:a16="http://schemas.microsoft.com/office/drawing/2014/main" id="{6635C14C-67CB-9BF2-7C4B-9688DAAF66E3}"/>
+              </a:ext>
+            </a:extLst>
+          </p:cNvPr>
+          <p:cNvCxnSpPr>
+            <a:cxnSpLocks noChangeShapeType="1"/>
+          </p:cNvCxnSpPr>
+          <p:nvPr/>
+        </p:nvCxnSpPr>
+        <p:spPr bwMode="auto">
+          <a:xfrm flipH="1">
+            <a:off x="4970562" y="3264726"/>
+            <a:ext cx="2224405" cy="0"/>
+          </a:xfrm>
+          <a:prstGeom prst="line">
+            <a:avLst/>
+          </a:prstGeom>
+          <a:noFill/>
+          <a:ln w="9525">
+            <a:solidFill>
+              <a:srgbClr val="000000"/>
+            </a:solidFill>
+            <a:round/>
+            <a:headEnd/>
+            <a:tailEnd type="triangle" w="med" len="med"/>
+          </a:ln>
+          <a:extLst>
+            <a:ext uri="{909E8E84-426E-40DD-AFC4-6F175D3DCCD1}">
+              <a14:hiddenFill xmlns:a14="http://schemas.microsoft.com/office/drawing/2010/main">
+                <a:noFill/>
+              </a14:hiddenFill>
+            </a:ext>
+          </a:extLst>
+        </p:spPr>
+      </p:cxnSp>
+      <p:cxnSp>
+        <p:nvCxnSpPr>
+          <p:cNvPr id="49" name="Line 17">
+            <a:extLst>
+              <a:ext uri="{FF2B5EF4-FFF2-40B4-BE49-F238E27FC236}">
+                <a16:creationId xmlns:a16="http://schemas.microsoft.com/office/drawing/2014/main" id="{9A156600-1570-F488-D735-8A0A9426E997}"/>
+              </a:ext>
+            </a:extLst>
+          </p:cNvPr>
+          <p:cNvCxnSpPr>
+            <a:cxnSpLocks noChangeShapeType="1"/>
+          </p:cNvCxnSpPr>
+          <p:nvPr/>
+        </p:nvCxnSpPr>
+        <p:spPr bwMode="auto">
+          <a:xfrm flipH="1">
+            <a:off x="4970562" y="3841197"/>
+            <a:ext cx="2224405" cy="0"/>
+          </a:xfrm>
+          <a:prstGeom prst="line">
+            <a:avLst/>
+          </a:prstGeom>
+          <a:noFill/>
+          <a:ln w="9525">
+            <a:solidFill>
+              <a:srgbClr val="000000"/>
+            </a:solidFill>
+            <a:round/>
+            <a:headEnd/>
+            <a:tailEnd type="triangle" w="med" len="med"/>
+          </a:ln>
+          <a:extLst>
+            <a:ext uri="{909E8E84-426E-40DD-AFC4-6F175D3DCCD1}">
+              <a14:hiddenFill xmlns:a14="http://schemas.microsoft.com/office/drawing/2010/main">
+                <a:noFill/>
+              </a14:hiddenFill>
+            </a:ext>
+          </a:extLst>
+        </p:spPr>
+      </p:cxnSp>
+      <p:cxnSp>
+        <p:nvCxnSpPr>
+          <p:cNvPr id="50" name="Line 17">
+            <a:extLst>
+              <a:ext uri="{FF2B5EF4-FFF2-40B4-BE49-F238E27FC236}">
+                <a16:creationId xmlns:a16="http://schemas.microsoft.com/office/drawing/2014/main" id="{1FB4239B-96A2-6B5B-DCC5-266FDD48C641}"/>
+              </a:ext>
+            </a:extLst>
+          </p:cNvPr>
+          <p:cNvCxnSpPr>
+            <a:cxnSpLocks noChangeShapeType="1"/>
+          </p:cNvCxnSpPr>
+          <p:nvPr/>
+        </p:nvCxnSpPr>
+        <p:spPr bwMode="auto">
+          <a:xfrm flipH="1">
+            <a:off x="4983814" y="4162563"/>
+            <a:ext cx="2224405" cy="0"/>
+          </a:xfrm>
+          <a:prstGeom prst="line">
+            <a:avLst/>
+          </a:prstGeom>
+          <a:noFill/>
+          <a:ln w="9525">
+            <a:solidFill>
+              <a:srgbClr val="000000"/>
+            </a:solidFill>
+            <a:round/>
+            <a:headEnd/>
+            <a:tailEnd type="triangle" w="med" len="med"/>
+          </a:ln>
+          <a:extLst>
+            <a:ext uri="{909E8E84-426E-40DD-AFC4-6F175D3DCCD1}">
+              <a14:hiddenFill xmlns:a14="http://schemas.microsoft.com/office/drawing/2010/main">
+                <a:noFill/>
+              </a14:hiddenFill>
+            </a:ext>
+          </a:extLst>
+        </p:spPr>
+      </p:cxnSp>
+      <p:cxnSp>
+        <p:nvCxnSpPr>
+          <p:cNvPr id="51" name="Line 17">
+            <a:extLst>
+              <a:ext uri="{FF2B5EF4-FFF2-40B4-BE49-F238E27FC236}">
+                <a16:creationId xmlns:a16="http://schemas.microsoft.com/office/drawing/2014/main" id="{21518288-7960-8243-A410-E74807F28DAA}"/>
+              </a:ext>
+            </a:extLst>
+          </p:cNvPr>
+          <p:cNvCxnSpPr>
+            <a:cxnSpLocks noChangeShapeType="1"/>
+          </p:cNvCxnSpPr>
+          <p:nvPr/>
+        </p:nvCxnSpPr>
+        <p:spPr bwMode="auto">
+          <a:xfrm flipH="1">
+            <a:off x="4967251" y="3539713"/>
+            <a:ext cx="2224405" cy="0"/>
+          </a:xfrm>
+          <a:prstGeom prst="line">
+            <a:avLst/>
+          </a:prstGeom>
+          <a:noFill/>
+          <a:ln w="9525">
+            <a:solidFill>
+              <a:srgbClr val="000000"/>
+            </a:solidFill>
+            <a:round/>
+            <a:headEnd/>
+            <a:tailEnd type="triangle" w="med" len="med"/>
+          </a:ln>
+          <a:extLst>
+            <a:ext uri="{909E8E84-426E-40DD-AFC4-6F175D3DCCD1}">
+              <a14:hiddenFill xmlns:a14="http://schemas.microsoft.com/office/drawing/2010/main">
+                <a:noFill/>
+              </a14:hiddenFill>
+            </a:ext>
+          </a:extLst>
+        </p:spPr>
+      </p:cxnSp>
+      <p:cxnSp>
+        <p:nvCxnSpPr>
+          <p:cNvPr id="52" name="Line 17">
+            <a:extLst>
+              <a:ext uri="{FF2B5EF4-FFF2-40B4-BE49-F238E27FC236}">
+                <a16:creationId xmlns:a16="http://schemas.microsoft.com/office/drawing/2014/main" id="{5574A200-C833-8EC4-4578-82139B0C921C}"/>
+              </a:ext>
+            </a:extLst>
+          </p:cNvPr>
+          <p:cNvCxnSpPr>
+            <a:cxnSpLocks noChangeShapeType="1"/>
+          </p:cNvCxnSpPr>
+          <p:nvPr/>
+        </p:nvCxnSpPr>
+        <p:spPr bwMode="auto">
+          <a:xfrm flipH="1">
+            <a:off x="4980499" y="4477303"/>
+            <a:ext cx="2224405" cy="0"/>
+          </a:xfrm>
+          <a:prstGeom prst="line">
+            <a:avLst/>
+          </a:prstGeom>
+          <a:noFill/>
+          <a:ln w="9525">
+            <a:solidFill>
+              <a:srgbClr val="000000"/>
+            </a:solidFill>
+            <a:round/>
+            <a:headEnd/>
+            <a:tailEnd type="triangle" w="med" len="med"/>
+          </a:ln>
+          <a:extLst>
+            <a:ext uri="{909E8E84-426E-40DD-AFC4-6F175D3DCCD1}">
+              <a14:hiddenFill xmlns:a14="http://schemas.microsoft.com/office/drawing/2010/main">
+                <a:noFill/>
+              </a14:hiddenFill>
+            </a:ext>
+          </a:extLst>
+        </p:spPr>
+      </p:cxnSp>
+    </p:spTree>
+    <p:extLst>
+      <p:ext uri="{BB962C8B-B14F-4D97-AF65-F5344CB8AC3E}">
+        <p14:creationId xmlns:p14="http://schemas.microsoft.com/office/powerpoint/2010/main" val="3344142256"/>
+      </p:ext>
+    </p:extLst>
+  </p:cSld>
+  <p:clrMapOvr>
+    <a:masterClrMapping/>
+  </p:clrMapOvr>
+</p:sld>
+</file>
+
 <file path=ppt/theme/theme1.xml><?xml version="1.0" encoding="utf-8"?>
 <a:theme xmlns:a="http://schemas.openxmlformats.org/drawingml/2006/main" name="Office Theme">
   <a:themeElements>

</xml_diff>